<commit_message>
g(phi) videos -> PPT
</commit_message>
<xml_diff>
--- a/PFMFEM.pptx
+++ b/PFMFEM.pptx
@@ -5,7 +5,7 @@
     <p:sldMasterId id="2147483733" r:id="rId1"/>
   </p:sldMasterIdLst>
   <p:notesMasterIdLst>
-    <p:notesMasterId r:id="rId17"/>
+    <p:notesMasterId r:id="rId20"/>
   </p:notesMasterIdLst>
   <p:sldIdLst>
     <p:sldId id="256" r:id="rId2"/>
@@ -23,6 +23,9 @@
     <p:sldId id="273" r:id="rId14"/>
     <p:sldId id="274" r:id="rId15"/>
     <p:sldId id="275" r:id="rId16"/>
+    <p:sldId id="276" r:id="rId17"/>
+    <p:sldId id="277" r:id="rId18"/>
+    <p:sldId id="278" r:id="rId19"/>
   </p:sldIdLst>
   <p:sldSz cx="12192000" cy="6858000"/>
   <p:notesSz cx="6858000" cy="9144000"/>
@@ -579,6 +582,90 @@
 </p:notes>
 </file>
 
+<file path=ppt/notesSlides/notesSlide10.xml><?xml version="1.0" encoding="utf-8"?>
+<p:notes xmlns:a="http://schemas.openxmlformats.org/drawingml/2006/main" xmlns:r="http://schemas.openxmlformats.org/officeDocument/2006/relationships" xmlns:p="http://schemas.openxmlformats.org/presentationml/2006/main">
+  <p:cSld>
+    <p:spTree>
+      <p:nvGrpSpPr>
+        <p:cNvPr id="1" name=""/>
+        <p:cNvGrpSpPr/>
+        <p:nvPr/>
+      </p:nvGrpSpPr>
+      <p:grpSpPr>
+        <a:xfrm>
+          <a:off x="0" y="0"/>
+          <a:ext cx="0" cy="0"/>
+          <a:chOff x="0" y="0"/>
+          <a:chExt cx="0" cy="0"/>
+        </a:xfrm>
+      </p:grpSpPr>
+      <p:sp>
+        <p:nvSpPr>
+          <p:cNvPr id="2" name="Slide Image Placeholder 1"/>
+          <p:cNvSpPr>
+            <a:spLocks noGrp="1" noRot="1" noChangeAspect="1"/>
+          </p:cNvSpPr>
+          <p:nvPr>
+            <p:ph type="sldImg"/>
+          </p:nvPr>
+        </p:nvSpPr>
+        <p:spPr/>
+      </p:sp>
+      <p:sp>
+        <p:nvSpPr>
+          <p:cNvPr id="3" name="Notes Placeholder 2"/>
+          <p:cNvSpPr>
+            <a:spLocks noGrp="1"/>
+          </p:cNvSpPr>
+          <p:nvPr>
+            <p:ph type="body" idx="1"/>
+          </p:nvPr>
+        </p:nvSpPr>
+        <p:spPr/>
+        <p:txBody>
+          <a:bodyPr/>
+          <a:lstStyle/>
+          <a:p>
+            <a:endParaRPr lang="en-US" dirty="0"/>
+          </a:p>
+        </p:txBody>
+      </p:sp>
+      <p:sp>
+        <p:nvSpPr>
+          <p:cNvPr id="4" name="Slide Number Placeholder 3"/>
+          <p:cNvSpPr>
+            <a:spLocks noGrp="1"/>
+          </p:cNvSpPr>
+          <p:nvPr>
+            <p:ph type="sldNum" sz="quarter" idx="10"/>
+          </p:nvPr>
+        </p:nvSpPr>
+        <p:spPr/>
+        <p:txBody>
+          <a:bodyPr/>
+          <a:lstStyle/>
+          <a:p>
+            <a:fld id="{EE8B852E-2CC2-4BFF-A9F5-B5CF0680D6AA}" type="slidenum">
+              <a:rPr lang="en-US" smtClean="0"/>
+              <a:t>17</a:t>
+            </a:fld>
+            <a:endParaRPr lang="en-US"/>
+          </a:p>
+        </p:txBody>
+      </p:sp>
+    </p:spTree>
+    <p:extLst>
+      <p:ext uri="{BB962C8B-B14F-4D97-AF65-F5344CB8AC3E}">
+        <p14:creationId xmlns:p14="http://schemas.microsoft.com/office/powerpoint/2010/main" val="998244552"/>
+      </p:ext>
+    </p:extLst>
+  </p:cSld>
+  <p:clrMapOvr>
+    <a:masterClrMapping/>
+  </p:clrMapOvr>
+</p:notes>
+</file>
+
 <file path=ppt/notesSlides/notesSlide2.xml><?xml version="1.0" encoding="utf-8"?>
 <p:notes xmlns:a="http://schemas.openxmlformats.org/drawingml/2006/main" xmlns:r="http://schemas.openxmlformats.org/officeDocument/2006/relationships" xmlns:p="http://schemas.openxmlformats.org/presentationml/2006/main">
   <p:cSld>
@@ -1097,11 +1184,7 @@
           <a:p>
             <a:r>
               <a:rPr lang="en-US" dirty="0" smtClean="0"/>
-              <a:t>Not considering </a:t>
-            </a:r>
-            <a:r>
-              <a:rPr lang="en-US" dirty="0" smtClean="0"/>
-              <a:t>g(phi). Red square is equal</a:t>
+              <a:t>Not considering g(phi). Red square is equal</a:t>
             </a:r>
             <a:r>
               <a:rPr lang="en-US" baseline="0" dirty="0" smtClean="0"/>
@@ -1226,6 +1309,90 @@
     <p:extLst>
       <p:ext uri="{BB962C8B-B14F-4D97-AF65-F5344CB8AC3E}">
         <p14:creationId xmlns:p14="http://schemas.microsoft.com/office/powerpoint/2010/main" val="740315919"/>
+      </p:ext>
+    </p:extLst>
+  </p:cSld>
+  <p:clrMapOvr>
+    <a:masterClrMapping/>
+  </p:clrMapOvr>
+</p:notes>
+</file>
+
+<file path=ppt/notesSlides/notesSlide9.xml><?xml version="1.0" encoding="utf-8"?>
+<p:notes xmlns:a="http://schemas.openxmlformats.org/drawingml/2006/main" xmlns:r="http://schemas.openxmlformats.org/officeDocument/2006/relationships" xmlns:p="http://schemas.openxmlformats.org/presentationml/2006/main">
+  <p:cSld>
+    <p:spTree>
+      <p:nvGrpSpPr>
+        <p:cNvPr id="1" name=""/>
+        <p:cNvGrpSpPr/>
+        <p:nvPr/>
+      </p:nvGrpSpPr>
+      <p:grpSpPr>
+        <a:xfrm>
+          <a:off x="0" y="0"/>
+          <a:ext cx="0" cy="0"/>
+          <a:chOff x="0" y="0"/>
+          <a:chExt cx="0" cy="0"/>
+        </a:xfrm>
+      </p:grpSpPr>
+      <p:sp>
+        <p:nvSpPr>
+          <p:cNvPr id="2" name="Slide Image Placeholder 1"/>
+          <p:cNvSpPr>
+            <a:spLocks noGrp="1" noRot="1" noChangeAspect="1"/>
+          </p:cNvSpPr>
+          <p:nvPr>
+            <p:ph type="sldImg"/>
+          </p:nvPr>
+        </p:nvSpPr>
+        <p:spPr/>
+      </p:sp>
+      <p:sp>
+        <p:nvSpPr>
+          <p:cNvPr id="3" name="Notes Placeholder 2"/>
+          <p:cNvSpPr>
+            <a:spLocks noGrp="1"/>
+          </p:cNvSpPr>
+          <p:nvPr>
+            <p:ph type="body" idx="1"/>
+          </p:nvPr>
+        </p:nvSpPr>
+        <p:spPr/>
+        <p:txBody>
+          <a:bodyPr/>
+          <a:lstStyle/>
+          <a:p>
+            <a:endParaRPr lang="en-US" dirty="0"/>
+          </a:p>
+        </p:txBody>
+      </p:sp>
+      <p:sp>
+        <p:nvSpPr>
+          <p:cNvPr id="4" name="Slide Number Placeholder 3"/>
+          <p:cNvSpPr>
+            <a:spLocks noGrp="1"/>
+          </p:cNvSpPr>
+          <p:nvPr>
+            <p:ph type="sldNum" sz="quarter" idx="10"/>
+          </p:nvPr>
+        </p:nvSpPr>
+        <p:spPr/>
+        <p:txBody>
+          <a:bodyPr/>
+          <a:lstStyle/>
+          <a:p>
+            <a:fld id="{EE8B852E-2CC2-4BFF-A9F5-B5CF0680D6AA}" type="slidenum">
+              <a:rPr lang="en-US" smtClean="0"/>
+              <a:t>16</a:t>
+            </a:fld>
+            <a:endParaRPr lang="en-US"/>
+          </a:p>
+        </p:txBody>
+      </p:sp>
+    </p:spTree>
+    <p:extLst>
+      <p:ext uri="{BB962C8B-B14F-4D97-AF65-F5344CB8AC3E}">
+        <p14:creationId xmlns:p14="http://schemas.microsoft.com/office/powerpoint/2010/main" val="754816248"/>
       </p:ext>
     </p:extLst>
   </p:cSld>
@@ -4717,15 +4884,7 @@
             </a:pPr>
             <a:r>
               <a:rPr lang="en-US" sz="4400" dirty="0" smtClean="0"/>
-              <a:t> </a:t>
-            </a:r>
-            <a:r>
-              <a:rPr lang="en-US" sz="4400" dirty="0" smtClean="0"/>
-              <a:t>Rectangular domain with triangular </a:t>
-            </a:r>
-            <a:r>
-              <a:rPr lang="en-US" sz="4400" dirty="0" smtClean="0"/>
-              <a:t>elements</a:t>
+              <a:t> Rectangular domain with triangular elements</a:t>
             </a:r>
           </a:p>
           <a:p>
@@ -4828,8 +4987,8 @@
           </a:p>
         </p:txBody>
       </p:sp>
-      <mc:AlternateContent xmlns:mc="http://schemas.openxmlformats.org/markup-compatibility/2006">
-        <mc:Choice xmlns:a14="http://schemas.microsoft.com/office/drawing/2010/main" Requires="a14">
+      <mc:AlternateContent xmlns:mc="http://schemas.openxmlformats.org/markup-compatibility/2006" xmlns:a14="http://schemas.microsoft.com/office/drawing/2010/main">
+        <mc:Choice Requires="a14">
           <p:sp>
             <p:nvSpPr>
               <p:cNvPr id="3" name="Content Placeholder 2"/>
@@ -5093,7 +5252,7 @@
             </p:txBody>
           </p:sp>
         </mc:Choice>
-        <mc:Fallback>
+        <mc:Fallback xmlns="">
           <p:sp>
             <p:nvSpPr>
               <p:cNvPr id="3" name="Content Placeholder 2"/>
@@ -5453,43 +5612,25 @@
                   <a:buFont typeface="Arial" charset="0"/>
                   <a:buChar char="•"/>
                 </a:pPr>
-                <a:r>
-                  <a:rPr lang="en-US" sz="3600" dirty="0" smtClean="0"/>
-                  <a:t> </a:t>
-                </a:r>
-                <a:r>
-                  <a:rPr lang="en-US" sz="4000" dirty="0" smtClean="0"/>
-                  <a:t>On-going work </a:t>
-                </a:r>
-              </a:p>
-              <a:p>
-                <a:pPr>
-                  <a:buFont typeface="Arial" charset="0"/>
-                  <a:buChar char="•"/>
-                </a:pPr>
-                <a:r>
-                  <a:rPr lang="en-US" sz="4000" dirty="0"/>
-                  <a:t> </a:t>
-                </a:r>
                 <a14:m>
                   <m:oMath xmlns:m="http://schemas.openxmlformats.org/officeDocument/2006/math">
                     <m:f>
                       <m:fPr>
                         <m:ctrlPr>
-                          <a:rPr lang="en-US" sz="4000" i="1">
+                          <a:rPr lang="en-US" sz="4800" i="1" smtClean="0">
                             <a:latin typeface="Cambria Math" charset="0"/>
                           </a:rPr>
                         </m:ctrlPr>
                       </m:fPr>
                       <m:num>
                         <m:r>
-                          <a:rPr lang="en-US" sz="4000" i="1">
+                          <a:rPr lang="en-US" sz="4800" i="1">
                             <a:latin typeface="Cambria Math" charset="0"/>
                           </a:rPr>
                           <m:t>𝜕</m:t>
                         </m:r>
                         <m:r>
-                          <a:rPr lang="en-US" sz="4000" i="1">
+                          <a:rPr lang="en-US" sz="4800" i="1">
                             <a:latin typeface="Cambria Math" charset="0"/>
                             <a:ea typeface="Cambria Math" charset="0"/>
                             <a:cs typeface="Cambria Math" charset="0"/>
@@ -5499,13 +5640,13 @@
                       </m:num>
                       <m:den>
                         <m:r>
-                          <a:rPr lang="en-US" sz="4000" i="1">
+                          <a:rPr lang="en-US" sz="4800" i="1">
                             <a:latin typeface="Cambria Math" charset="0"/>
                           </a:rPr>
                           <m:t>𝜕</m:t>
                         </m:r>
                         <m:r>
-                          <a:rPr lang="en-US" sz="4000" i="1">
+                          <a:rPr lang="en-US" sz="4800" i="1">
                             <a:latin typeface="Cambria Math" charset="0"/>
                           </a:rPr>
                           <m:t>𝑡</m:t>
@@ -5513,40 +5654,40 @@
                       </m:den>
                     </m:f>
                     <m:r>
-                      <a:rPr lang="en-US" sz="4000" i="1">
+                      <a:rPr lang="en-US" sz="4800" i="1">
                         <a:latin typeface="Cambria Math" panose="02040503050406030204" pitchFamily="18" charset="0"/>
                       </a:rPr>
                       <m:t>−</m:t>
                     </m:r>
                     <m:r>
-                      <a:rPr lang="en-US" sz="4000" i="1">
+                      <a:rPr lang="en-US" sz="4800" i="1">
                         <a:latin typeface="Cambria Math" charset="0"/>
                       </a:rPr>
                       <m:t>2</m:t>
                     </m:r>
                     <m:r>
-                      <a:rPr lang="en-US" sz="4000" i="1">
+                      <a:rPr lang="en-US" sz="4800" i="1">
                         <a:latin typeface="Cambria Math" panose="02040503050406030204" pitchFamily="18" charset="0"/>
                         <a:ea typeface="Cambria Math" panose="02040503050406030204" pitchFamily="18" charset="0"/>
                       </a:rPr>
                       <m:t>𝛻</m:t>
                     </m:r>
                     <m:r>
-                      <a:rPr lang="en-US" sz="4000" i="1">
+                      <a:rPr lang="en-US" sz="4800" i="1">
                         <a:latin typeface="Cambria Math" panose="02040503050406030204" pitchFamily="18" charset="0"/>
                         <a:ea typeface="Cambria Math" panose="02040503050406030204" pitchFamily="18" charset="0"/>
                       </a:rPr>
                       <m:t> ∙</m:t>
                     </m:r>
                     <m:r>
-                      <a:rPr lang="en-US" sz="4000" i="1">
+                      <a:rPr lang="en-US" sz="4800" i="1">
                         <a:latin typeface="Cambria Math" panose="02040503050406030204" pitchFamily="18" charset="0"/>
                         <a:ea typeface="Cambria Math" panose="02040503050406030204" pitchFamily="18" charset="0"/>
                       </a:rPr>
                       <m:t>𝛻𝜙</m:t>
                     </m:r>
                     <m:r>
-                      <a:rPr lang="en-US" sz="4000" i="1">
+                      <a:rPr lang="en-US" sz="4800" i="1">
                         <a:latin typeface="Cambria Math" panose="02040503050406030204" pitchFamily="18" charset="0"/>
                         <a:ea typeface="Cambria Math" charset="0"/>
                         <a:cs typeface="Cambria Math" charset="0"/>
@@ -5554,7 +5695,7 @@
                       <m:t>+</m:t>
                     </m:r>
                     <m:r>
-                      <a:rPr lang="en-US" sz="4000" i="1">
+                      <a:rPr lang="en-US" sz="4800" i="1">
                         <a:latin typeface="Cambria Math" charset="0"/>
                       </a:rPr>
                       <m:t>𝑔</m:t>
@@ -5562,14 +5703,14 @@
                     <m:d>
                       <m:dPr>
                         <m:ctrlPr>
-                          <a:rPr lang="en-US" sz="4000" i="1">
+                          <a:rPr lang="en-US" sz="4800" i="1">
                             <a:latin typeface="Cambria Math" charset="0"/>
                           </a:rPr>
                         </m:ctrlPr>
                       </m:dPr>
                       <m:e>
                         <m:r>
-                          <a:rPr lang="en-US" sz="4000" i="1">
+                          <a:rPr lang="en-US" sz="4800" i="1">
                             <a:latin typeface="Cambria Math" charset="0"/>
                             <a:ea typeface="Cambria Math" charset="0"/>
                             <a:cs typeface="Cambria Math" charset="0"/>
@@ -5579,7 +5720,7 @@
                       </m:e>
                     </m:d>
                     <m:r>
-                      <a:rPr lang="en-US" sz="4000" i="1">
+                      <a:rPr lang="en-US" sz="4800" i="1">
                         <a:latin typeface="Cambria Math" panose="02040503050406030204" pitchFamily="18" charset="0"/>
                         <a:ea typeface="Cambria Math" charset="0"/>
                         <a:cs typeface="Cambria Math" charset="0"/>
@@ -5587,7 +5728,7 @@
                       <m:t>=0</m:t>
                     </m:r>
                     <m:r>
-                      <a:rPr lang="en-US" sz="4000" b="0" i="0" smtClean="0">
+                      <a:rPr lang="en-US" sz="4800" b="0" i="0" smtClean="0">
                         <a:latin typeface="Cambria Math" charset="0"/>
                         <a:ea typeface="Cambria Math" charset="0"/>
                         <a:cs typeface="Cambria Math" charset="0"/>
@@ -5596,7 +5737,56 @@
                     </m:r>
                   </m:oMath>
                 </a14:m>
-                <a:endParaRPr lang="en-US" sz="4000" dirty="0"/>
+                <a:endParaRPr lang="en-US" sz="4800" dirty="0" smtClean="0"/>
+              </a:p>
+              <a:p>
+                <a:pPr>
+                  <a:buFont typeface="Arial" charset="0"/>
+                  <a:buChar char="•"/>
+                </a:pPr>
+                <a14:m>
+                  <m:oMath xmlns:m="http://schemas.openxmlformats.org/officeDocument/2006/math">
+                    <m:r>
+                      <a:rPr lang="en-US" sz="4800" b="0" i="1" smtClean="0">
+                        <a:latin typeface="Cambria Math" charset="0"/>
+                      </a:rPr>
+                      <m:t>𝑔</m:t>
+                    </m:r>
+                    <m:r>
+                      <a:rPr lang="en-US" sz="4800" b="0" i="1" smtClean="0">
+                        <a:latin typeface="Cambria Math" charset="0"/>
+                      </a:rPr>
+                      <m:t>(</m:t>
+                    </m:r>
+                    <m:r>
+                      <a:rPr lang="en-US" sz="4800" b="0" i="1" smtClean="0">
+                        <a:latin typeface="Cambria Math" charset="0"/>
+                      </a:rPr>
+                      <m:t>𝜙</m:t>
+                    </m:r>
+                    <m:r>
+                      <a:rPr lang="en-US" sz="4800" b="0" i="1" smtClean="0">
+                        <a:latin typeface="Cambria Math" charset="0"/>
+                      </a:rPr>
+                      <m:t>)</m:t>
+                    </m:r>
+                  </m:oMath>
+                </a14:m>
+                <a:r>
+                  <a:rPr lang="en-US" sz="4800" dirty="0" smtClean="0"/>
+                  <a:t> is considered.</a:t>
+                </a:r>
+              </a:p>
+              <a:p>
+                <a:pPr>
+                  <a:buFont typeface="Arial" charset="0"/>
+                  <a:buChar char="•"/>
+                </a:pPr>
+                <a:r>
+                  <a:rPr lang="en-US" sz="4800" dirty="0" smtClean="0"/>
+                  <a:t>Only explicit method is applied.</a:t>
+                </a:r>
+                <a:endParaRPr lang="en-US" sz="4800" dirty="0"/>
               </a:p>
             </p:txBody>
           </p:sp>
@@ -5616,7 +5806,7 @@
               <a:blipFill rotWithShape="0">
                 <a:blip r:embed="rId3"/>
                 <a:stretch>
-                  <a:fillRect l="-2447" t="-4242"/>
+                  <a:fillRect l="-3074"/>
                 </a:stretch>
               </a:blipFill>
             </p:spPr>
@@ -5639,6 +5829,1157 @@
     <p:extLst>
       <p:ext uri="{BB962C8B-B14F-4D97-AF65-F5344CB8AC3E}">
         <p14:creationId xmlns:p14="http://schemas.microsoft.com/office/powerpoint/2010/main" val="2096757966"/>
+      </p:ext>
+    </p:extLst>
+  </p:cSld>
+  <p:clrMapOvr>
+    <a:masterClrMapping/>
+  </p:clrMapOvr>
+</p:sld>
+</file>
+
+<file path=ppt/slides/slide16.xml><?xml version="1.0" encoding="utf-8"?>
+<p:sld xmlns:a="http://schemas.openxmlformats.org/drawingml/2006/main" xmlns:r="http://schemas.openxmlformats.org/officeDocument/2006/relationships" xmlns:p="http://schemas.openxmlformats.org/presentationml/2006/main">
+  <p:cSld>
+    <p:spTree>
+      <p:nvGrpSpPr>
+        <p:cNvPr id="1" name=""/>
+        <p:cNvGrpSpPr/>
+        <p:nvPr/>
+      </p:nvGrpSpPr>
+      <p:grpSpPr>
+        <a:xfrm>
+          <a:off x="0" y="0"/>
+          <a:ext cx="0" cy="0"/>
+          <a:chOff x="0" y="0"/>
+          <a:chExt cx="0" cy="0"/>
+        </a:xfrm>
+      </p:grpSpPr>
+      <p:sp>
+        <p:nvSpPr>
+          <p:cNvPr id="2" name="Title 1"/>
+          <p:cNvSpPr>
+            <a:spLocks noGrp="1"/>
+          </p:cNvSpPr>
+          <p:nvPr>
+            <p:ph type="title"/>
+          </p:nvPr>
+        </p:nvSpPr>
+        <p:spPr/>
+        <p:txBody>
+          <a:bodyPr/>
+          <a:lstStyle/>
+          <a:p>
+            <a:endParaRPr lang="en-US" dirty="0"/>
+          </a:p>
+        </p:txBody>
+      </p:sp>
+      <p:pic>
+        <p:nvPicPr>
+          <p:cNvPr id="4" name="fem_eps_1m_0">
+            <a:hlinkClick r:id="" action="ppaction://media"/>
+          </p:cNvPr>
+          <p:cNvPicPr>
+            <a:picLocks noGrp="1" noChangeAspect="1"/>
+          </p:cNvPicPr>
+          <p:nvPr>
+            <p:ph idx="1"/>
+            <a:videoFile r:link="rId2"/>
+            <p:extLst>
+              <p:ext uri="{DAA4B4D4-6D71-4841-9C94-3DE7FCFB9230}">
+                <p14:media xmlns:p14="http://schemas.microsoft.com/office/powerpoint/2010/main" r:embed="rId1"/>
+              </p:ext>
+            </p:extLst>
+          </p:nvPr>
+        </p:nvPicPr>
+        <p:blipFill rotWithShape="1">
+          <a:blip r:embed="rId7"/>
+          <a:srcRect l="-1" r="33579"/>
+          <a:stretch/>
+        </p:blipFill>
+        <p:spPr>
+          <a:xfrm>
+            <a:off x="0" y="0"/>
+            <a:ext cx="6074229" cy="6858000"/>
+          </a:xfrm>
+        </p:spPr>
+      </p:pic>
+      <p:pic>
+        <p:nvPicPr>
+          <p:cNvPr id="5" name="fem_eps_10m_0">
+            <a:hlinkClick r:id="" action="ppaction://media"/>
+          </p:cNvPr>
+          <p:cNvPicPr>
+            <a:picLocks noChangeAspect="1"/>
+          </p:cNvPicPr>
+          <p:nvPr>
+            <a:videoFile r:link="rId4"/>
+            <p:extLst>
+              <p:ext uri="{DAA4B4D4-6D71-4841-9C94-3DE7FCFB9230}">
+                <p14:media xmlns:p14="http://schemas.microsoft.com/office/powerpoint/2010/main" r:embed="rId3"/>
+              </p:ext>
+            </p:extLst>
+          </p:nvPr>
+        </p:nvPicPr>
+        <p:blipFill rotWithShape="1">
+          <a:blip r:embed="rId7"/>
+          <a:srcRect l="33215" r="-119"/>
+          <a:stretch/>
+        </p:blipFill>
+        <p:spPr>
+          <a:xfrm>
+            <a:off x="6074229" y="0"/>
+            <a:ext cx="6117771" cy="6858000"/>
+          </a:xfrm>
+          <a:prstGeom prst="rect">
+            <a:avLst/>
+          </a:prstGeom>
+        </p:spPr>
+      </p:pic>
+      <mc:AlternateContent xmlns:mc="http://schemas.openxmlformats.org/markup-compatibility/2006">
+        <mc:Choice xmlns:a14="http://schemas.microsoft.com/office/drawing/2010/main" Requires="a14">
+          <p:sp>
+            <p:nvSpPr>
+              <p:cNvPr id="7" name="TextBox 6"/>
+              <p:cNvSpPr txBox="1"/>
+              <p:nvPr/>
+            </p:nvSpPr>
+            <p:spPr>
+              <a:xfrm>
+                <a:off x="1024128" y="2551837"/>
+                <a:ext cx="2225258" cy="1754326"/>
+              </a:xfrm>
+              <a:prstGeom prst="rect">
+                <a:avLst/>
+              </a:prstGeom>
+              <a:noFill/>
+            </p:spPr>
+            <p:txBody>
+              <a:bodyPr wrap="square" rtlCol="0">
+                <a:spAutoFit/>
+              </a:bodyPr>
+              <a:lstStyle/>
+              <a:p>
+                <a14:m>
+                  <m:oMathPara xmlns:m="http://schemas.openxmlformats.org/officeDocument/2006/math">
+                    <m:oMathParaPr>
+                      <m:jc m:val="centerGroup"/>
+                    </m:oMathParaPr>
+                    <m:oMath xmlns:m="http://schemas.openxmlformats.org/officeDocument/2006/math">
+                      <m:r>
+                        <a:rPr lang="en-US" sz="5400" b="0" i="1" smtClean="0">
+                          <a:latin typeface="Cambria Math" charset="0"/>
+                          <a:ea typeface="Cambria Math" charset="0"/>
+                          <a:cs typeface="Cambria Math" charset="0"/>
+                        </a:rPr>
+                        <m:t>𝜖</m:t>
+                      </m:r>
+                      <m:r>
+                        <a:rPr lang="en-US" sz="5400" b="0" i="1" smtClean="0">
+                          <a:latin typeface="Cambria Math" charset="0"/>
+                          <a:ea typeface="Cambria Math" charset="0"/>
+                          <a:cs typeface="Cambria Math" charset="0"/>
+                        </a:rPr>
+                        <m:t>=1</m:t>
+                      </m:r>
+                    </m:oMath>
+                  </m:oMathPara>
+                </a14:m>
+                <a:endParaRPr lang="en-US" sz="5400" b="0" dirty="0" smtClean="0">
+                  <a:ea typeface="Cambria Math" charset="0"/>
+                  <a:cs typeface="Cambria Math" charset="0"/>
+                </a:endParaRPr>
+              </a:p>
+              <a:p>
+                <a14:m>
+                  <m:oMathPara xmlns:m="http://schemas.openxmlformats.org/officeDocument/2006/math">
+                    <m:oMathParaPr>
+                      <m:jc m:val="centerGroup"/>
+                    </m:oMathParaPr>
+                    <m:oMath xmlns:m="http://schemas.openxmlformats.org/officeDocument/2006/math">
+                      <m:r>
+                        <a:rPr lang="en-US" sz="5400" b="0" i="1" smtClean="0">
+                          <a:latin typeface="Cambria Math" charset="0"/>
+                        </a:rPr>
+                        <m:t>𝑚</m:t>
+                      </m:r>
+                      <m:r>
+                        <a:rPr lang="en-US" sz="5400" b="0" i="1" smtClean="0">
+                          <a:latin typeface="Cambria Math" charset="0"/>
+                        </a:rPr>
+                        <m:t>=0</m:t>
+                      </m:r>
+                    </m:oMath>
+                  </m:oMathPara>
+                </a14:m>
+                <a:endParaRPr lang="en-US" sz="5400" dirty="0"/>
+              </a:p>
+            </p:txBody>
+          </p:sp>
+        </mc:Choice>
+        <mc:Fallback>
+          <p:sp>
+            <p:nvSpPr>
+              <p:cNvPr id="7" name="TextBox 6"/>
+              <p:cNvSpPr txBox="1">
+                <a:spLocks noRot="1" noChangeAspect="1" noMove="1" noResize="1" noEditPoints="1" noAdjustHandles="1" noChangeArrowheads="1" noChangeShapeType="1" noTextEdit="1"/>
+              </p:cNvSpPr>
+              <p:nvPr/>
+            </p:nvSpPr>
+            <p:spPr>
+              <a:xfrm>
+                <a:off x="1024128" y="2551837"/>
+                <a:ext cx="2225258" cy="1754326"/>
+              </a:xfrm>
+              <a:prstGeom prst="rect">
+                <a:avLst/>
+              </a:prstGeom>
+              <a:blipFill rotWithShape="0">
+                <a:blip r:embed="rId8"/>
+                <a:stretch>
+                  <a:fillRect/>
+                </a:stretch>
+              </a:blipFill>
+            </p:spPr>
+            <p:txBody>
+              <a:bodyPr/>
+              <a:lstStyle/>
+              <a:p>
+                <a:r>
+                  <a:rPr lang="en-US">
+                    <a:noFill/>
+                  </a:rPr>
+                  <a:t> </a:t>
+                </a:r>
+              </a:p>
+            </p:txBody>
+          </p:sp>
+        </mc:Fallback>
+      </mc:AlternateContent>
+      <mc:AlternateContent xmlns:mc="http://schemas.openxmlformats.org/markup-compatibility/2006">
+        <mc:Choice xmlns:a14="http://schemas.microsoft.com/office/drawing/2010/main" Requires="a14">
+          <p:sp>
+            <p:nvSpPr>
+              <p:cNvPr id="8" name="TextBox 7"/>
+              <p:cNvSpPr txBox="1"/>
+              <p:nvPr/>
+            </p:nvSpPr>
+            <p:spPr>
+              <a:xfrm>
+                <a:off x="8518942" y="2551837"/>
+                <a:ext cx="3041688" cy="1754326"/>
+              </a:xfrm>
+              <a:prstGeom prst="rect">
+                <a:avLst/>
+              </a:prstGeom>
+              <a:noFill/>
+            </p:spPr>
+            <p:txBody>
+              <a:bodyPr wrap="square" rtlCol="0">
+                <a:spAutoFit/>
+              </a:bodyPr>
+              <a:lstStyle/>
+              <a:p>
+                <a14:m>
+                  <m:oMathPara xmlns:m="http://schemas.openxmlformats.org/officeDocument/2006/math">
+                    <m:oMathParaPr>
+                      <m:jc m:val="centerGroup"/>
+                    </m:oMathParaPr>
+                    <m:oMath xmlns:m="http://schemas.openxmlformats.org/officeDocument/2006/math">
+                      <m:r>
+                        <a:rPr lang="en-US" sz="5400" b="0" i="1" smtClean="0">
+                          <a:latin typeface="Cambria Math" charset="0"/>
+                          <a:ea typeface="Cambria Math" charset="0"/>
+                          <a:cs typeface="Cambria Math" charset="0"/>
+                        </a:rPr>
+                        <m:t>𝜖</m:t>
+                      </m:r>
+                      <m:r>
+                        <a:rPr lang="en-US" sz="5400" b="0" i="1" smtClean="0">
+                          <a:latin typeface="Cambria Math" charset="0"/>
+                          <a:ea typeface="Cambria Math" charset="0"/>
+                          <a:cs typeface="Cambria Math" charset="0"/>
+                        </a:rPr>
+                        <m:t>=10</m:t>
+                      </m:r>
+                    </m:oMath>
+                  </m:oMathPara>
+                </a14:m>
+                <a:endParaRPr lang="en-US" sz="5400" b="0" dirty="0" smtClean="0">
+                  <a:ea typeface="Cambria Math" charset="0"/>
+                  <a:cs typeface="Cambria Math" charset="0"/>
+                </a:endParaRPr>
+              </a:p>
+              <a:p>
+                <a14:m>
+                  <m:oMathPara xmlns:m="http://schemas.openxmlformats.org/officeDocument/2006/math">
+                    <m:oMathParaPr>
+                      <m:jc m:val="centerGroup"/>
+                    </m:oMathParaPr>
+                    <m:oMath xmlns:m="http://schemas.openxmlformats.org/officeDocument/2006/math">
+                      <m:r>
+                        <a:rPr lang="en-US" sz="5400" b="0" i="1" dirty="0" smtClean="0">
+                          <a:latin typeface="Cambria Math" charset="0"/>
+                        </a:rPr>
+                        <m:t>𝑚</m:t>
+                      </m:r>
+                      <m:r>
+                        <a:rPr lang="en-US" sz="5400" b="0" i="1" dirty="0" smtClean="0">
+                          <a:latin typeface="Cambria Math" charset="0"/>
+                        </a:rPr>
+                        <m:t>=0    </m:t>
+                      </m:r>
+                    </m:oMath>
+                  </m:oMathPara>
+                </a14:m>
+                <a:endParaRPr lang="en-US" sz="5400" dirty="0"/>
+              </a:p>
+            </p:txBody>
+          </p:sp>
+        </mc:Choice>
+        <mc:Fallback>
+          <p:sp>
+            <p:nvSpPr>
+              <p:cNvPr id="8" name="TextBox 7"/>
+              <p:cNvSpPr txBox="1">
+                <a:spLocks noRot="1" noChangeAspect="1" noMove="1" noResize="1" noEditPoints="1" noAdjustHandles="1" noChangeArrowheads="1" noChangeShapeType="1" noTextEdit="1"/>
+              </p:cNvSpPr>
+              <p:nvPr/>
+            </p:nvSpPr>
+            <p:spPr>
+              <a:xfrm>
+                <a:off x="8518942" y="2551837"/>
+                <a:ext cx="3041688" cy="1754326"/>
+              </a:xfrm>
+              <a:prstGeom prst="rect">
+                <a:avLst/>
+              </a:prstGeom>
+              <a:blipFill rotWithShape="0">
+                <a:blip r:embed="rId9"/>
+                <a:stretch>
+                  <a:fillRect/>
+                </a:stretch>
+              </a:blipFill>
+            </p:spPr>
+            <p:txBody>
+              <a:bodyPr/>
+              <a:lstStyle/>
+              <a:p>
+                <a:r>
+                  <a:rPr lang="en-US">
+                    <a:noFill/>
+                  </a:rPr>
+                  <a:t> </a:t>
+                </a:r>
+              </a:p>
+            </p:txBody>
+          </p:sp>
+        </mc:Fallback>
+      </mc:AlternateContent>
+    </p:spTree>
+    <p:extLst>
+      <p:ext uri="{BB962C8B-B14F-4D97-AF65-F5344CB8AC3E}">
+        <p14:creationId xmlns:p14="http://schemas.microsoft.com/office/powerpoint/2010/main" val="82714151"/>
+      </p:ext>
+    </p:extLst>
+  </p:cSld>
+  <p:clrMapOvr>
+    <a:masterClrMapping/>
+  </p:clrMapOvr>
+  <p:timing>
+    <p:tnLst>
+      <p:par>
+        <p:cTn id="1" dur="indefinite" restart="never" nodeType="tmRoot">
+          <p:childTnLst>
+            <p:seq concurrent="1" nextAc="seek">
+              <p:cTn id="2" restart="whenNotActive" fill="hold" evtFilter="cancelBubble" nodeType="interactiveSeq">
+                <p:stCondLst>
+                  <p:cond evt="onClick" delay="0">
+                    <p:tgtEl>
+                      <p:spTgt spid="4"/>
+                    </p:tgtEl>
+                  </p:cond>
+                </p:stCondLst>
+                <p:endSync evt="end" delay="0">
+                  <p:rtn val="all"/>
+                </p:endSync>
+                <p:childTnLst>
+                  <p:par>
+                    <p:cTn id="3" fill="hold">
+                      <p:stCondLst>
+                        <p:cond delay="0"/>
+                      </p:stCondLst>
+                      <p:childTnLst>
+                        <p:par>
+                          <p:cTn id="4" fill="hold">
+                            <p:stCondLst>
+                              <p:cond delay="0"/>
+                            </p:stCondLst>
+                            <p:childTnLst>
+                              <p:par>
+                                <p:cTn id="5" presetID="2" presetClass="mediacall" presetSubtype="0" fill="hold" nodeType="clickEffect">
+                                  <p:stCondLst>
+                                    <p:cond delay="0"/>
+                                  </p:stCondLst>
+                                  <p:childTnLst>
+                                    <p:cmd type="call" cmd="togglePause">
+                                      <p:cBhvr>
+                                        <p:cTn id="6" dur="1" fill="hold"/>
+                                        <p:tgtEl>
+                                          <p:spTgt spid="4"/>
+                                        </p:tgtEl>
+                                      </p:cBhvr>
+                                    </p:cmd>
+                                  </p:childTnLst>
+                                </p:cTn>
+                              </p:par>
+                            </p:childTnLst>
+                          </p:cTn>
+                        </p:par>
+                      </p:childTnLst>
+                    </p:cTn>
+                  </p:par>
+                </p:childTnLst>
+              </p:cTn>
+              <p:nextCondLst>
+                <p:cond evt="onClick" delay="0">
+                  <p:tgtEl>
+                    <p:spTgt spid="4"/>
+                  </p:tgtEl>
+                </p:cond>
+              </p:nextCondLst>
+            </p:seq>
+            <p:video>
+              <p:cMediaNode vol="80000">
+                <p:cTn id="7" fill="hold" display="0">
+                  <p:stCondLst>
+                    <p:cond delay="indefinite"/>
+                  </p:stCondLst>
+                </p:cTn>
+                <p:tgtEl>
+                  <p:spTgt spid="4"/>
+                </p:tgtEl>
+              </p:cMediaNode>
+            </p:video>
+            <p:seq concurrent="1" nextAc="seek">
+              <p:cTn id="8" restart="whenNotActive" fill="hold" evtFilter="cancelBubble" nodeType="interactiveSeq">
+                <p:stCondLst>
+                  <p:cond evt="onClick" delay="0">
+                    <p:tgtEl>
+                      <p:spTgt spid="5"/>
+                    </p:tgtEl>
+                  </p:cond>
+                </p:stCondLst>
+                <p:endSync evt="end" delay="0">
+                  <p:rtn val="all"/>
+                </p:endSync>
+                <p:childTnLst>
+                  <p:par>
+                    <p:cTn id="9" fill="hold">
+                      <p:stCondLst>
+                        <p:cond delay="0"/>
+                      </p:stCondLst>
+                      <p:childTnLst>
+                        <p:par>
+                          <p:cTn id="10" fill="hold">
+                            <p:stCondLst>
+                              <p:cond delay="0"/>
+                            </p:stCondLst>
+                            <p:childTnLst>
+                              <p:par>
+                                <p:cTn id="11" presetID="2" presetClass="mediacall" presetSubtype="0" fill="hold" nodeType="clickEffect">
+                                  <p:stCondLst>
+                                    <p:cond delay="0"/>
+                                  </p:stCondLst>
+                                  <p:childTnLst>
+                                    <p:cmd type="call" cmd="togglePause">
+                                      <p:cBhvr>
+                                        <p:cTn id="12" dur="1" fill="hold"/>
+                                        <p:tgtEl>
+                                          <p:spTgt spid="5"/>
+                                        </p:tgtEl>
+                                      </p:cBhvr>
+                                    </p:cmd>
+                                  </p:childTnLst>
+                                </p:cTn>
+                              </p:par>
+                            </p:childTnLst>
+                          </p:cTn>
+                        </p:par>
+                      </p:childTnLst>
+                    </p:cTn>
+                  </p:par>
+                </p:childTnLst>
+              </p:cTn>
+              <p:nextCondLst>
+                <p:cond evt="onClick" delay="0">
+                  <p:tgtEl>
+                    <p:spTgt spid="5"/>
+                  </p:tgtEl>
+                </p:cond>
+              </p:nextCondLst>
+            </p:seq>
+            <p:video>
+              <p:cMediaNode vol="80000">
+                <p:cTn id="13" fill="hold" display="0">
+                  <p:stCondLst>
+                    <p:cond delay="indefinite"/>
+                  </p:stCondLst>
+                </p:cTn>
+                <p:tgtEl>
+                  <p:spTgt spid="5"/>
+                </p:tgtEl>
+              </p:cMediaNode>
+            </p:video>
+          </p:childTnLst>
+        </p:cTn>
+      </p:par>
+    </p:tnLst>
+  </p:timing>
+</p:sld>
+</file>
+
+<file path=ppt/slides/slide17.xml><?xml version="1.0" encoding="utf-8"?>
+<p:sld xmlns:a="http://schemas.openxmlformats.org/drawingml/2006/main" xmlns:r="http://schemas.openxmlformats.org/officeDocument/2006/relationships" xmlns:p="http://schemas.openxmlformats.org/presentationml/2006/main">
+  <p:cSld>
+    <p:spTree>
+      <p:nvGrpSpPr>
+        <p:cNvPr id="1" name=""/>
+        <p:cNvGrpSpPr/>
+        <p:nvPr/>
+      </p:nvGrpSpPr>
+      <p:grpSpPr>
+        <a:xfrm>
+          <a:off x="0" y="0"/>
+          <a:ext cx="0" cy="0"/>
+          <a:chOff x="0" y="0"/>
+          <a:chExt cx="0" cy="0"/>
+        </a:xfrm>
+      </p:grpSpPr>
+      <p:pic>
+        <p:nvPicPr>
+          <p:cNvPr id="4" name="fem_eps_1m_-1">
+            <a:hlinkClick r:id="" action="ppaction://media"/>
+          </p:cNvPr>
+          <p:cNvPicPr>
+            <a:picLocks noChangeAspect="1"/>
+          </p:cNvPicPr>
+          <p:nvPr>
+            <a:videoFile r:link="rId2"/>
+            <p:extLst>
+              <p:ext uri="{DAA4B4D4-6D71-4841-9C94-3DE7FCFB9230}">
+                <p14:media xmlns:p14="http://schemas.microsoft.com/office/powerpoint/2010/main" r:embed="rId1"/>
+              </p:ext>
+            </p:extLst>
+          </p:nvPr>
+        </p:nvPicPr>
+        <p:blipFill rotWithShape="1">
+          <a:blip r:embed="rId7"/>
+          <a:srcRect r="33564"/>
+          <a:stretch/>
+        </p:blipFill>
+        <p:spPr>
+          <a:xfrm>
+            <a:off x="14288" y="4762"/>
+            <a:ext cx="6076270" cy="6859531"/>
+          </a:xfrm>
+          <a:prstGeom prst="rect">
+            <a:avLst/>
+          </a:prstGeom>
+        </p:spPr>
+      </p:pic>
+      <p:pic>
+        <p:nvPicPr>
+          <p:cNvPr id="5" name="fem_eps_1m_1">
+            <a:hlinkClick r:id="" action="ppaction://media"/>
+          </p:cNvPr>
+          <p:cNvPicPr>
+            <a:picLocks noChangeAspect="1"/>
+          </p:cNvPicPr>
+          <p:nvPr>
+            <a:videoFile r:link="rId4"/>
+            <p:extLst>
+              <p:ext uri="{DAA4B4D4-6D71-4841-9C94-3DE7FCFB9230}">
+                <p14:media xmlns:p14="http://schemas.microsoft.com/office/powerpoint/2010/main" r:embed="rId3"/>
+              </p:ext>
+            </p:extLst>
+          </p:nvPr>
+        </p:nvPicPr>
+        <p:blipFill rotWithShape="1">
+          <a:blip r:embed="rId7"/>
+          <a:srcRect l="33277"/>
+          <a:stretch/>
+        </p:blipFill>
+        <p:spPr>
+          <a:xfrm>
+            <a:off x="6090557" y="5953"/>
+            <a:ext cx="6101443" cy="6858340"/>
+          </a:xfrm>
+          <a:prstGeom prst="rect">
+            <a:avLst/>
+          </a:prstGeom>
+        </p:spPr>
+      </p:pic>
+      <mc:AlternateContent xmlns:mc="http://schemas.openxmlformats.org/markup-compatibility/2006">
+        <mc:Choice xmlns:a14="http://schemas.microsoft.com/office/drawing/2010/main" Requires="a14">
+          <p:sp>
+            <p:nvSpPr>
+              <p:cNvPr id="6" name="TextBox 5"/>
+              <p:cNvSpPr txBox="1"/>
+              <p:nvPr/>
+            </p:nvSpPr>
+            <p:spPr>
+              <a:xfrm>
+                <a:off x="391886" y="2551837"/>
+                <a:ext cx="2857500" cy="1754326"/>
+              </a:xfrm>
+              <a:prstGeom prst="rect">
+                <a:avLst/>
+              </a:prstGeom>
+              <a:noFill/>
+            </p:spPr>
+            <p:txBody>
+              <a:bodyPr wrap="square" rtlCol="0">
+                <a:spAutoFit/>
+              </a:bodyPr>
+              <a:lstStyle/>
+              <a:p>
+                <a14:m>
+                  <m:oMathPara xmlns:m="http://schemas.openxmlformats.org/officeDocument/2006/math">
+                    <m:oMathParaPr>
+                      <m:jc m:val="centerGroup"/>
+                    </m:oMathParaPr>
+                    <m:oMath xmlns:m="http://schemas.openxmlformats.org/officeDocument/2006/math">
+                      <m:r>
+                        <a:rPr lang="en-US" sz="5400" b="0" i="1" smtClean="0">
+                          <a:latin typeface="Cambria Math" charset="0"/>
+                          <a:ea typeface="Cambria Math" charset="0"/>
+                          <a:cs typeface="Cambria Math" charset="0"/>
+                        </a:rPr>
+                        <m:t>𝜖</m:t>
+                      </m:r>
+                      <m:r>
+                        <a:rPr lang="en-US" sz="5400" b="0" i="1" smtClean="0">
+                          <a:latin typeface="Cambria Math" charset="0"/>
+                          <a:ea typeface="Cambria Math" charset="0"/>
+                          <a:cs typeface="Cambria Math" charset="0"/>
+                        </a:rPr>
+                        <m:t>=1</m:t>
+                      </m:r>
+                    </m:oMath>
+                  </m:oMathPara>
+                </a14:m>
+                <a:endParaRPr lang="en-US" sz="5400" b="0" dirty="0" smtClean="0">
+                  <a:ea typeface="Cambria Math" charset="0"/>
+                  <a:cs typeface="Cambria Math" charset="0"/>
+                </a:endParaRPr>
+              </a:p>
+              <a:p>
+                <a14:m>
+                  <m:oMathPara xmlns:m="http://schemas.openxmlformats.org/officeDocument/2006/math">
+                    <m:oMathParaPr>
+                      <m:jc m:val="centerGroup"/>
+                    </m:oMathParaPr>
+                    <m:oMath xmlns:m="http://schemas.openxmlformats.org/officeDocument/2006/math">
+                      <m:r>
+                        <a:rPr lang="en-US" sz="5400" b="0" i="1" smtClean="0">
+                          <a:latin typeface="Cambria Math" charset="0"/>
+                        </a:rPr>
+                        <m:t>𝑚</m:t>
+                      </m:r>
+                      <m:r>
+                        <a:rPr lang="en-US" sz="5400" b="0" i="1" smtClean="0">
+                          <a:latin typeface="Cambria Math" charset="0"/>
+                        </a:rPr>
+                        <m:t>=−1</m:t>
+                      </m:r>
+                    </m:oMath>
+                  </m:oMathPara>
+                </a14:m>
+                <a:endParaRPr lang="en-US" sz="5400" dirty="0"/>
+              </a:p>
+            </p:txBody>
+          </p:sp>
+        </mc:Choice>
+        <mc:Fallback>
+          <p:sp>
+            <p:nvSpPr>
+              <p:cNvPr id="6" name="TextBox 5"/>
+              <p:cNvSpPr txBox="1">
+                <a:spLocks noRot="1" noChangeAspect="1" noMove="1" noResize="1" noEditPoints="1" noAdjustHandles="1" noChangeArrowheads="1" noChangeShapeType="1" noTextEdit="1"/>
+              </p:cNvSpPr>
+              <p:nvPr/>
+            </p:nvSpPr>
+            <p:spPr>
+              <a:xfrm>
+                <a:off x="391886" y="2551837"/>
+                <a:ext cx="2857500" cy="1754326"/>
+              </a:xfrm>
+              <a:prstGeom prst="rect">
+                <a:avLst/>
+              </a:prstGeom>
+              <a:blipFill rotWithShape="0">
+                <a:blip r:embed="rId8"/>
+                <a:stretch>
+                  <a:fillRect/>
+                </a:stretch>
+              </a:blipFill>
+            </p:spPr>
+            <p:txBody>
+              <a:bodyPr/>
+              <a:lstStyle/>
+              <a:p>
+                <a:r>
+                  <a:rPr lang="en-US">
+                    <a:noFill/>
+                  </a:rPr>
+                  <a:t> </a:t>
+                </a:r>
+              </a:p>
+            </p:txBody>
+          </p:sp>
+        </mc:Fallback>
+      </mc:AlternateContent>
+      <mc:AlternateContent xmlns:mc="http://schemas.openxmlformats.org/markup-compatibility/2006">
+        <mc:Choice xmlns:a14="http://schemas.microsoft.com/office/drawing/2010/main" Requires="a14">
+          <p:sp>
+            <p:nvSpPr>
+              <p:cNvPr id="7" name="TextBox 6"/>
+              <p:cNvSpPr txBox="1"/>
+              <p:nvPr/>
+            </p:nvSpPr>
+            <p:spPr>
+              <a:xfrm>
+                <a:off x="9013372" y="2551837"/>
+                <a:ext cx="2857500" cy="1754326"/>
+              </a:xfrm>
+              <a:prstGeom prst="rect">
+                <a:avLst/>
+              </a:prstGeom>
+              <a:noFill/>
+            </p:spPr>
+            <p:txBody>
+              <a:bodyPr wrap="square" rtlCol="0">
+                <a:spAutoFit/>
+              </a:bodyPr>
+              <a:lstStyle/>
+              <a:p>
+                <a14:m>
+                  <m:oMathPara xmlns:m="http://schemas.openxmlformats.org/officeDocument/2006/math">
+                    <m:oMathParaPr>
+                      <m:jc m:val="centerGroup"/>
+                    </m:oMathParaPr>
+                    <m:oMath xmlns:m="http://schemas.openxmlformats.org/officeDocument/2006/math">
+                      <m:r>
+                        <a:rPr lang="en-US" sz="5400" b="0" i="1" smtClean="0">
+                          <a:latin typeface="Cambria Math" charset="0"/>
+                          <a:ea typeface="Cambria Math" charset="0"/>
+                          <a:cs typeface="Cambria Math" charset="0"/>
+                        </a:rPr>
+                        <m:t>𝜖</m:t>
+                      </m:r>
+                      <m:r>
+                        <a:rPr lang="en-US" sz="5400" b="0" i="1" smtClean="0">
+                          <a:latin typeface="Cambria Math" charset="0"/>
+                          <a:ea typeface="Cambria Math" charset="0"/>
+                          <a:cs typeface="Cambria Math" charset="0"/>
+                        </a:rPr>
+                        <m:t>=1</m:t>
+                      </m:r>
+                    </m:oMath>
+                  </m:oMathPara>
+                </a14:m>
+                <a:endParaRPr lang="en-US" sz="5400" b="0" dirty="0" smtClean="0">
+                  <a:ea typeface="Cambria Math" charset="0"/>
+                  <a:cs typeface="Cambria Math" charset="0"/>
+                </a:endParaRPr>
+              </a:p>
+              <a:p>
+                <a14:m>
+                  <m:oMathPara xmlns:m="http://schemas.openxmlformats.org/officeDocument/2006/math">
+                    <m:oMathParaPr>
+                      <m:jc m:val="centerGroup"/>
+                    </m:oMathParaPr>
+                    <m:oMath xmlns:m="http://schemas.openxmlformats.org/officeDocument/2006/math">
+                      <m:r>
+                        <a:rPr lang="en-US" sz="5400" b="0" i="1" smtClean="0">
+                          <a:latin typeface="Cambria Math" charset="0"/>
+                        </a:rPr>
+                        <m:t>𝑚</m:t>
+                      </m:r>
+                      <m:r>
+                        <a:rPr lang="en-US" sz="5400" b="0" i="1" smtClean="0">
+                          <a:latin typeface="Cambria Math" charset="0"/>
+                        </a:rPr>
+                        <m:t>=+1</m:t>
+                      </m:r>
+                    </m:oMath>
+                  </m:oMathPara>
+                </a14:m>
+                <a:endParaRPr lang="en-US" sz="5400" dirty="0"/>
+              </a:p>
+            </p:txBody>
+          </p:sp>
+        </mc:Choice>
+        <mc:Fallback>
+          <p:sp>
+            <p:nvSpPr>
+              <p:cNvPr id="7" name="TextBox 6"/>
+              <p:cNvSpPr txBox="1">
+                <a:spLocks noRot="1" noChangeAspect="1" noMove="1" noResize="1" noEditPoints="1" noAdjustHandles="1" noChangeArrowheads="1" noChangeShapeType="1" noTextEdit="1"/>
+              </p:cNvSpPr>
+              <p:nvPr/>
+            </p:nvSpPr>
+            <p:spPr>
+              <a:xfrm>
+                <a:off x="9013372" y="2551837"/>
+                <a:ext cx="2857500" cy="1754326"/>
+              </a:xfrm>
+              <a:prstGeom prst="rect">
+                <a:avLst/>
+              </a:prstGeom>
+              <a:blipFill rotWithShape="0">
+                <a:blip r:embed="rId9"/>
+                <a:stretch>
+                  <a:fillRect/>
+                </a:stretch>
+              </a:blipFill>
+            </p:spPr>
+            <p:txBody>
+              <a:bodyPr/>
+              <a:lstStyle/>
+              <a:p>
+                <a:r>
+                  <a:rPr lang="en-US">
+                    <a:noFill/>
+                  </a:rPr>
+                  <a:t> </a:t>
+                </a:r>
+              </a:p>
+            </p:txBody>
+          </p:sp>
+        </mc:Fallback>
+      </mc:AlternateContent>
+    </p:spTree>
+    <p:extLst>
+      <p:ext uri="{BB962C8B-B14F-4D97-AF65-F5344CB8AC3E}">
+        <p14:creationId xmlns:p14="http://schemas.microsoft.com/office/powerpoint/2010/main" val="1010777307"/>
+      </p:ext>
+    </p:extLst>
+  </p:cSld>
+  <p:clrMapOvr>
+    <a:masterClrMapping/>
+  </p:clrMapOvr>
+  <p:timing>
+    <p:tnLst>
+      <p:par>
+        <p:cTn id="1" dur="indefinite" restart="never" nodeType="tmRoot">
+          <p:childTnLst>
+            <p:seq concurrent="1" nextAc="seek">
+              <p:cTn id="2" restart="whenNotActive" fill="hold" evtFilter="cancelBubble" nodeType="interactiveSeq">
+                <p:stCondLst>
+                  <p:cond evt="onClick" delay="0">
+                    <p:tgtEl>
+                      <p:spTgt spid="4"/>
+                    </p:tgtEl>
+                  </p:cond>
+                </p:stCondLst>
+                <p:endSync evt="end" delay="0">
+                  <p:rtn val="all"/>
+                </p:endSync>
+                <p:childTnLst>
+                  <p:par>
+                    <p:cTn id="3" fill="hold">
+                      <p:stCondLst>
+                        <p:cond delay="0"/>
+                      </p:stCondLst>
+                      <p:childTnLst>
+                        <p:par>
+                          <p:cTn id="4" fill="hold">
+                            <p:stCondLst>
+                              <p:cond delay="0"/>
+                            </p:stCondLst>
+                            <p:childTnLst>
+                              <p:par>
+                                <p:cTn id="5" presetID="2" presetClass="mediacall" presetSubtype="0" fill="hold" nodeType="clickEffect">
+                                  <p:stCondLst>
+                                    <p:cond delay="0"/>
+                                  </p:stCondLst>
+                                  <p:childTnLst>
+                                    <p:cmd type="call" cmd="togglePause">
+                                      <p:cBhvr>
+                                        <p:cTn id="6" dur="1" fill="hold"/>
+                                        <p:tgtEl>
+                                          <p:spTgt spid="4"/>
+                                        </p:tgtEl>
+                                      </p:cBhvr>
+                                    </p:cmd>
+                                  </p:childTnLst>
+                                </p:cTn>
+                              </p:par>
+                            </p:childTnLst>
+                          </p:cTn>
+                        </p:par>
+                      </p:childTnLst>
+                    </p:cTn>
+                  </p:par>
+                </p:childTnLst>
+              </p:cTn>
+              <p:nextCondLst>
+                <p:cond evt="onClick" delay="0">
+                  <p:tgtEl>
+                    <p:spTgt spid="4"/>
+                  </p:tgtEl>
+                </p:cond>
+              </p:nextCondLst>
+            </p:seq>
+            <p:video>
+              <p:cMediaNode vol="80000">
+                <p:cTn id="7" fill="hold" display="0">
+                  <p:stCondLst>
+                    <p:cond delay="indefinite"/>
+                  </p:stCondLst>
+                </p:cTn>
+                <p:tgtEl>
+                  <p:spTgt spid="4"/>
+                </p:tgtEl>
+              </p:cMediaNode>
+            </p:video>
+            <p:seq concurrent="1" nextAc="seek">
+              <p:cTn id="8" restart="whenNotActive" fill="hold" evtFilter="cancelBubble" nodeType="interactiveSeq">
+                <p:stCondLst>
+                  <p:cond evt="onClick" delay="0">
+                    <p:tgtEl>
+                      <p:spTgt spid="5"/>
+                    </p:tgtEl>
+                  </p:cond>
+                </p:stCondLst>
+                <p:endSync evt="end" delay="0">
+                  <p:rtn val="all"/>
+                </p:endSync>
+                <p:childTnLst>
+                  <p:par>
+                    <p:cTn id="9" fill="hold">
+                      <p:stCondLst>
+                        <p:cond delay="0"/>
+                      </p:stCondLst>
+                      <p:childTnLst>
+                        <p:par>
+                          <p:cTn id="10" fill="hold">
+                            <p:stCondLst>
+                              <p:cond delay="0"/>
+                            </p:stCondLst>
+                            <p:childTnLst>
+                              <p:par>
+                                <p:cTn id="11" presetID="2" presetClass="mediacall" presetSubtype="0" fill="hold" nodeType="clickEffect">
+                                  <p:stCondLst>
+                                    <p:cond delay="0"/>
+                                  </p:stCondLst>
+                                  <p:childTnLst>
+                                    <p:cmd type="call" cmd="togglePause">
+                                      <p:cBhvr>
+                                        <p:cTn id="12" dur="1" fill="hold"/>
+                                        <p:tgtEl>
+                                          <p:spTgt spid="5"/>
+                                        </p:tgtEl>
+                                      </p:cBhvr>
+                                    </p:cmd>
+                                  </p:childTnLst>
+                                </p:cTn>
+                              </p:par>
+                            </p:childTnLst>
+                          </p:cTn>
+                        </p:par>
+                      </p:childTnLst>
+                    </p:cTn>
+                  </p:par>
+                </p:childTnLst>
+              </p:cTn>
+              <p:nextCondLst>
+                <p:cond evt="onClick" delay="0">
+                  <p:tgtEl>
+                    <p:spTgt spid="5"/>
+                  </p:tgtEl>
+                </p:cond>
+              </p:nextCondLst>
+            </p:seq>
+            <p:video>
+              <p:cMediaNode vol="80000">
+                <p:cTn id="13" fill="hold" display="0">
+                  <p:stCondLst>
+                    <p:cond delay="indefinite"/>
+                  </p:stCondLst>
+                </p:cTn>
+                <p:tgtEl>
+                  <p:spTgt spid="5"/>
+                </p:tgtEl>
+              </p:cMediaNode>
+            </p:video>
+          </p:childTnLst>
+        </p:cTn>
+      </p:par>
+    </p:tnLst>
+  </p:timing>
+</p:sld>
+</file>
+
+<file path=ppt/slides/slide18.xml><?xml version="1.0" encoding="utf-8"?>
+<p:sld xmlns:a="http://schemas.openxmlformats.org/drawingml/2006/main" xmlns:r="http://schemas.openxmlformats.org/officeDocument/2006/relationships" xmlns:p="http://schemas.openxmlformats.org/presentationml/2006/main">
+  <p:cSld>
+    <p:spTree>
+      <p:nvGrpSpPr>
+        <p:cNvPr id="1" name=""/>
+        <p:cNvGrpSpPr/>
+        <p:nvPr/>
+      </p:nvGrpSpPr>
+      <p:grpSpPr>
+        <a:xfrm>
+          <a:off x="0" y="0"/>
+          <a:ext cx="0" cy="0"/>
+          <a:chOff x="0" y="0"/>
+          <a:chExt cx="0" cy="0"/>
+        </a:xfrm>
+      </p:grpSpPr>
+      <p:sp>
+        <p:nvSpPr>
+          <p:cNvPr id="2" name="Title 1"/>
+          <p:cNvSpPr>
+            <a:spLocks noGrp="1"/>
+          </p:cNvSpPr>
+          <p:nvPr>
+            <p:ph type="title"/>
+          </p:nvPr>
+        </p:nvSpPr>
+        <p:spPr/>
+        <p:txBody>
+          <a:bodyPr/>
+          <a:lstStyle/>
+          <a:p>
+            <a:r>
+              <a:rPr lang="en-US" dirty="0" smtClean="0"/>
+              <a:t>Future work</a:t>
+            </a:r>
+            <a:endParaRPr lang="en-US" dirty="0"/>
+          </a:p>
+        </p:txBody>
+      </p:sp>
+      <p:sp>
+        <p:nvSpPr>
+          <p:cNvPr id="3" name="Content Placeholder 2"/>
+          <p:cNvSpPr>
+            <a:spLocks noGrp="1"/>
+          </p:cNvSpPr>
+          <p:nvPr>
+            <p:ph sz="half" idx="1"/>
+          </p:nvPr>
+        </p:nvSpPr>
+        <p:spPr/>
+        <p:txBody>
+          <a:bodyPr>
+            <a:normAutofit/>
+          </a:bodyPr>
+          <a:lstStyle/>
+          <a:p>
+            <a:pPr>
+              <a:buFont typeface="Arial" charset="0"/>
+              <a:buChar char="•"/>
+            </a:pPr>
+            <a:r>
+              <a:rPr lang="en-US" sz="4000" dirty="0" smtClean="0"/>
+              <a:t>Flexibility</a:t>
+            </a:r>
+          </a:p>
+          <a:p>
+            <a:pPr marL="536575" lvl="1" indent="-130175">
+              <a:buFont typeface="Arial" charset="0"/>
+              <a:buChar char="•"/>
+            </a:pPr>
+            <a:r>
+              <a:rPr lang="en-US" sz="3600" dirty="0" smtClean="0"/>
+              <a:t>mesh grid</a:t>
+            </a:r>
+          </a:p>
+          <a:p>
+            <a:pPr marL="536575" lvl="1" indent="-130175">
+              <a:buFont typeface="Arial" charset="0"/>
+              <a:buChar char="•"/>
+            </a:pPr>
+            <a:r>
+              <a:rPr lang="en-US" sz="3600" dirty="0" smtClean="0"/>
+              <a:t>quadrature points</a:t>
+            </a:r>
+          </a:p>
+          <a:p>
+            <a:pPr marL="536575" lvl="1" indent="-130175">
+              <a:buFont typeface="Arial" charset="0"/>
+              <a:buChar char="•"/>
+            </a:pPr>
+            <a:r>
+              <a:rPr lang="en-US" sz="3600" dirty="0" smtClean="0"/>
+              <a:t>quadratic base </a:t>
+            </a:r>
+            <a:r>
+              <a:rPr lang="en-US" sz="3600" dirty="0" err="1" smtClean="0"/>
+              <a:t>fns</a:t>
+            </a:r>
+            <a:endParaRPr lang="en-US" sz="3600" dirty="0" smtClean="0"/>
+          </a:p>
+        </p:txBody>
+      </p:sp>
+      <p:sp>
+        <p:nvSpPr>
+          <p:cNvPr id="4" name="Content Placeholder 3"/>
+          <p:cNvSpPr>
+            <a:spLocks noGrp="1"/>
+          </p:cNvSpPr>
+          <p:nvPr>
+            <p:ph sz="half" idx="2"/>
+          </p:nvPr>
+        </p:nvSpPr>
+        <p:spPr/>
+        <p:txBody>
+          <a:bodyPr/>
+          <a:lstStyle/>
+          <a:p>
+            <a:pPr>
+              <a:buFont typeface="Arial" charset="0"/>
+              <a:buChar char="•"/>
+            </a:pPr>
+            <a:r>
+              <a:rPr lang="en-US" sz="4000" dirty="0" smtClean="0"/>
+              <a:t>Speed</a:t>
+            </a:r>
+          </a:p>
+          <a:p>
+            <a:pPr marL="765175" lvl="1" indent="-228600">
+              <a:buFont typeface="Arial" charset="0"/>
+              <a:buChar char="•"/>
+            </a:pPr>
+            <a:r>
+              <a:rPr lang="en-US" sz="3600" dirty="0" smtClean="0"/>
+              <a:t>algorithm</a:t>
+            </a:r>
+          </a:p>
+          <a:p>
+            <a:pPr marL="765175" lvl="1" indent="-228600">
+              <a:buFont typeface="Arial" charset="0"/>
+              <a:buChar char="•"/>
+            </a:pPr>
+            <a:r>
+              <a:rPr lang="en-US" sz="3600" smtClean="0"/>
+              <a:t>C code</a:t>
+            </a:r>
+            <a:endParaRPr lang="en-US" sz="3600" dirty="0"/>
+          </a:p>
+          <a:p>
+            <a:endParaRPr lang="en-US" dirty="0"/>
+          </a:p>
+        </p:txBody>
+      </p:sp>
+    </p:spTree>
+    <p:extLst>
+      <p:ext uri="{BB962C8B-B14F-4D97-AF65-F5344CB8AC3E}">
+        <p14:creationId xmlns:p14="http://schemas.microsoft.com/office/powerpoint/2010/main" val="174694287"/>
       </p:ext>
     </p:extLst>
   </p:cSld>
@@ -6241,8 +7582,8 @@
           </a:p>
         </p:txBody>
       </p:sp>
-      <mc:AlternateContent xmlns:mc="http://schemas.openxmlformats.org/markup-compatibility/2006">
-        <mc:Choice xmlns:a14="http://schemas.microsoft.com/office/drawing/2010/main" Requires="a14">
+      <mc:AlternateContent xmlns:mc="http://schemas.openxmlformats.org/markup-compatibility/2006" xmlns:a14="http://schemas.microsoft.com/office/drawing/2010/main">
+        <mc:Choice Requires="a14">
           <p:sp>
             <p:nvSpPr>
               <p:cNvPr id="4" name="Content Placeholder 2"/>
@@ -6997,7 +8338,7 @@
             </p:txBody>
           </p:sp>
         </mc:Choice>
-        <mc:Fallback>
+        <mc:Fallback xmlns="">
           <p:sp>
             <p:nvSpPr>
               <p:cNvPr id="4" name="Content Placeholder 2"/>
@@ -7754,8 +9095,8 @@
           </a:p>
         </p:txBody>
       </p:sp>
-      <mc:AlternateContent xmlns:mc="http://schemas.openxmlformats.org/markup-compatibility/2006">
-        <mc:Choice xmlns:a14="http://schemas.microsoft.com/office/drawing/2010/main" Requires="a14">
+      <mc:AlternateContent xmlns:mc="http://schemas.openxmlformats.org/markup-compatibility/2006" xmlns:a14="http://schemas.microsoft.com/office/drawing/2010/main">
+        <mc:Choice Requires="a14">
           <p:sp>
             <p:nvSpPr>
               <p:cNvPr id="3" name="Content Placeholder 2"/>
@@ -7997,7 +9338,7 @@
             </p:txBody>
           </p:sp>
         </mc:Choice>
-        <mc:Fallback>
+        <mc:Fallback xmlns="">
           <p:sp>
             <p:nvSpPr>
               <p:cNvPr id="3" name="Content Placeholder 2"/>

</xml_diff>